<commit_message>
Updated credit and readme
</commit_message>
<xml_diff>
--- a/data/credit.pptx
+++ b/data/credit.pptx
@@ -200,7 +200,7 @@
           <a:p>
             <a:fld id="{148A6914-CB7E-432F-9F4B-CC7F37DC0438}" type="datetimeFigureOut">
               <a:rPr lang="en-US" smtClean="0"/>
-              <a:t>8/9/2021</a:t>
+              <a:t>10/20/2021</a:t>
             </a:fld>
             <a:endParaRPr lang="en-US"/>
           </a:p>
@@ -598,7 +598,7 @@
           <a:p>
             <a:fld id="{C35190AA-E4B7-45C6-A812-1637583B9BF7}" type="datetimeFigureOut">
               <a:rPr lang="en-US" smtClean="0"/>
-              <a:t>8/9/2021</a:t>
+              <a:t>10/20/2021</a:t>
             </a:fld>
             <a:endParaRPr lang="en-US"/>
           </a:p>
@@ -768,7 +768,7 @@
           <a:p>
             <a:fld id="{C35190AA-E4B7-45C6-A812-1637583B9BF7}" type="datetimeFigureOut">
               <a:rPr lang="en-US" smtClean="0"/>
-              <a:t>8/9/2021</a:t>
+              <a:t>10/20/2021</a:t>
             </a:fld>
             <a:endParaRPr lang="en-US"/>
           </a:p>
@@ -948,7 +948,7 @@
           <a:p>
             <a:fld id="{C35190AA-E4B7-45C6-A812-1637583B9BF7}" type="datetimeFigureOut">
               <a:rPr lang="en-US" smtClean="0"/>
-              <a:t>8/9/2021</a:t>
+              <a:t>10/20/2021</a:t>
             </a:fld>
             <a:endParaRPr lang="en-US"/>
           </a:p>
@@ -1118,7 +1118,7 @@
           <a:p>
             <a:fld id="{C35190AA-E4B7-45C6-A812-1637583B9BF7}" type="datetimeFigureOut">
               <a:rPr lang="en-US" smtClean="0"/>
-              <a:t>8/9/2021</a:t>
+              <a:t>10/20/2021</a:t>
             </a:fld>
             <a:endParaRPr lang="en-US"/>
           </a:p>
@@ -1364,7 +1364,7 @@
           <a:p>
             <a:fld id="{C35190AA-E4B7-45C6-A812-1637583B9BF7}" type="datetimeFigureOut">
               <a:rPr lang="en-US" smtClean="0"/>
-              <a:t>8/9/2021</a:t>
+              <a:t>10/20/2021</a:t>
             </a:fld>
             <a:endParaRPr lang="en-US"/>
           </a:p>
@@ -1596,7 +1596,7 @@
           <a:p>
             <a:fld id="{C35190AA-E4B7-45C6-A812-1637583B9BF7}" type="datetimeFigureOut">
               <a:rPr lang="en-US" smtClean="0"/>
-              <a:t>8/9/2021</a:t>
+              <a:t>10/20/2021</a:t>
             </a:fld>
             <a:endParaRPr lang="en-US"/>
           </a:p>
@@ -1963,7 +1963,7 @@
           <a:p>
             <a:fld id="{C35190AA-E4B7-45C6-A812-1637583B9BF7}" type="datetimeFigureOut">
               <a:rPr lang="en-US" smtClean="0"/>
-              <a:t>8/9/2021</a:t>
+              <a:t>10/20/2021</a:t>
             </a:fld>
             <a:endParaRPr lang="en-US"/>
           </a:p>
@@ -2081,7 +2081,7 @@
           <a:p>
             <a:fld id="{C35190AA-E4B7-45C6-A812-1637583B9BF7}" type="datetimeFigureOut">
               <a:rPr lang="en-US" smtClean="0"/>
-              <a:t>8/9/2021</a:t>
+              <a:t>10/20/2021</a:t>
             </a:fld>
             <a:endParaRPr lang="en-US"/>
           </a:p>
@@ -2176,7 +2176,7 @@
           <a:p>
             <a:fld id="{C35190AA-E4B7-45C6-A812-1637583B9BF7}" type="datetimeFigureOut">
               <a:rPr lang="en-US" smtClean="0"/>
-              <a:t>8/9/2021</a:t>
+              <a:t>10/20/2021</a:t>
             </a:fld>
             <a:endParaRPr lang="en-US"/>
           </a:p>
@@ -2453,7 +2453,7 @@
           <a:p>
             <a:fld id="{C35190AA-E4B7-45C6-A812-1637583B9BF7}" type="datetimeFigureOut">
               <a:rPr lang="en-US" smtClean="0"/>
-              <a:t>8/9/2021</a:t>
+              <a:t>10/20/2021</a:t>
             </a:fld>
             <a:endParaRPr lang="en-US"/>
           </a:p>
@@ -2710,7 +2710,7 @@
           <a:p>
             <a:fld id="{C35190AA-E4B7-45C6-A812-1637583B9BF7}" type="datetimeFigureOut">
               <a:rPr lang="en-US" smtClean="0"/>
-              <a:t>8/9/2021</a:t>
+              <a:t>10/20/2021</a:t>
             </a:fld>
             <a:endParaRPr lang="en-US"/>
           </a:p>
@@ -2923,7 +2923,7 @@
           <a:p>
             <a:fld id="{C35190AA-E4B7-45C6-A812-1637583B9BF7}" type="datetimeFigureOut">
               <a:rPr lang="en-US" smtClean="0"/>
-              <a:t>8/9/2021</a:t>
+              <a:t>10/20/2021</a:t>
             </a:fld>
             <a:endParaRPr lang="en-US"/>
           </a:p>
@@ -3416,6 +3416,16 @@
               </a:lnSpc>
             </a:pPr>
             <a:r>
+              <a:rPr lang="en-US" sz="2400">
+                <a:solidFill>
+                  <a:srgbClr val="000000"/>
+                </a:solidFill>
+                <a:latin typeface="Avenir Next LT Pro" panose="020B0504020202020204" pitchFamily="34" charset="0"/>
+                <a:cs typeface="Times" panose="02020603050405020304" pitchFamily="18" charset="0"/>
+              </a:rPr>
+              <a:t>Fall </a:t>
+            </a:r>
+            <a:r>
               <a:rPr lang="en-US" sz="2400" dirty="0">
                 <a:solidFill>
                   <a:srgbClr val="000000"/>
@@ -3423,7 +3433,7 @@
                 <a:latin typeface="Avenir Next LT Pro" panose="020B0504020202020204" pitchFamily="34" charset="0"/>
                 <a:cs typeface="Times" panose="02020603050405020304" pitchFamily="18" charset="0"/>
               </a:rPr>
-              <a:t>Q3 2021</a:t>
+              <a:t>2021</a:t>
             </a:r>
             <a:endParaRPr lang="en-US" sz="2400" dirty="0"/>
           </a:p>

</xml_diff>